<commit_message>
Updated Data and PowerPoint for Revision #2
</commit_message>
<xml_diff>
--- a/GettingStarted/UsingSCPCompanion.pptx
+++ b/GettingStarted/UsingSCPCompanion.pptx
@@ -5,7 +5,7 @@
     <p:sldMasterId id="2147483648" r:id="rId1"/>
   </p:sldMasterIdLst>
   <p:notesMasterIdLst>
-    <p:notesMasterId r:id="rId8"/>
+    <p:notesMasterId r:id="rId10"/>
   </p:notesMasterIdLst>
   <p:sldIdLst>
     <p:sldId id="256" r:id="rId2"/>
@@ -13,12 +13,14 @@
     <p:sldId id="262" r:id="rId4"/>
     <p:sldId id="259" r:id="rId5"/>
     <p:sldId id="260" r:id="rId6"/>
-    <p:sldId id="261" r:id="rId7"/>
+    <p:sldId id="263" r:id="rId7"/>
+    <p:sldId id="264" r:id="rId8"/>
+    <p:sldId id="261" r:id="rId9"/>
   </p:sldIdLst>
   <p:sldSz cx="12192000" cy="6858000"/>
   <p:notesSz cx="6858000" cy="9144000"/>
   <p:custDataLst>
-    <p:tags r:id="rId9"/>
+    <p:tags r:id="rId11"/>
   </p:custDataLst>
   <p:defaultTextStyle>
     <a:defPPr>
@@ -205,7 +207,7 @@
           <a:p>
             <a:fld id="{6E00A601-A693-4D66-BA19-3AAC3F1430E1}" type="datetimeFigureOut">
               <a:rPr lang="en-US" smtClean="0"/>
-              <a:t>5/7/2020</a:t>
+              <a:t>7/8/2020</a:t>
             </a:fld>
             <a:endParaRPr lang="en-US"/>
           </a:p>
@@ -604,7 +606,7 @@
           <a:p>
             <a:fld id="{2FB4BB17-FCBC-4595-8ACB-9B54EC581F3F}" type="datetimeFigureOut">
               <a:rPr lang="en-US" smtClean="0"/>
-              <a:t>5/7/2020</a:t>
+              <a:t>7/8/2020</a:t>
             </a:fld>
             <a:endParaRPr lang="en-US"/>
           </a:p>
@@ -774,7 +776,7 @@
           <a:p>
             <a:fld id="{2FB4BB17-FCBC-4595-8ACB-9B54EC581F3F}" type="datetimeFigureOut">
               <a:rPr lang="en-US" smtClean="0"/>
-              <a:t>5/7/2020</a:t>
+              <a:t>7/8/2020</a:t>
             </a:fld>
             <a:endParaRPr lang="en-US"/>
           </a:p>
@@ -954,7 +956,7 @@
           <a:p>
             <a:fld id="{2FB4BB17-FCBC-4595-8ACB-9B54EC581F3F}" type="datetimeFigureOut">
               <a:rPr lang="en-US" smtClean="0"/>
-              <a:t>5/7/2020</a:t>
+              <a:t>7/8/2020</a:t>
             </a:fld>
             <a:endParaRPr lang="en-US"/>
           </a:p>
@@ -1124,7 +1126,7 @@
           <a:p>
             <a:fld id="{2FB4BB17-FCBC-4595-8ACB-9B54EC581F3F}" type="datetimeFigureOut">
               <a:rPr lang="en-US" smtClean="0"/>
-              <a:t>5/7/2020</a:t>
+              <a:t>7/8/2020</a:t>
             </a:fld>
             <a:endParaRPr lang="en-US"/>
           </a:p>
@@ -1370,7 +1372,7 @@
           <a:p>
             <a:fld id="{2FB4BB17-FCBC-4595-8ACB-9B54EC581F3F}" type="datetimeFigureOut">
               <a:rPr lang="en-US" smtClean="0"/>
-              <a:t>5/7/2020</a:t>
+              <a:t>7/8/2020</a:t>
             </a:fld>
             <a:endParaRPr lang="en-US"/>
           </a:p>
@@ -1602,7 +1604,7 @@
           <a:p>
             <a:fld id="{2FB4BB17-FCBC-4595-8ACB-9B54EC581F3F}" type="datetimeFigureOut">
               <a:rPr lang="en-US" smtClean="0"/>
-              <a:t>5/7/2020</a:t>
+              <a:t>7/8/2020</a:t>
             </a:fld>
             <a:endParaRPr lang="en-US"/>
           </a:p>
@@ -1969,7 +1971,7 @@
           <a:p>
             <a:fld id="{2FB4BB17-FCBC-4595-8ACB-9B54EC581F3F}" type="datetimeFigureOut">
               <a:rPr lang="en-US" smtClean="0"/>
-              <a:t>5/7/2020</a:t>
+              <a:t>7/8/2020</a:t>
             </a:fld>
             <a:endParaRPr lang="en-US"/>
           </a:p>
@@ -2087,7 +2089,7 @@
           <a:p>
             <a:fld id="{2FB4BB17-FCBC-4595-8ACB-9B54EC581F3F}" type="datetimeFigureOut">
               <a:rPr lang="en-US" smtClean="0"/>
-              <a:t>5/7/2020</a:t>
+              <a:t>7/8/2020</a:t>
             </a:fld>
             <a:endParaRPr lang="en-US"/>
           </a:p>
@@ -2182,7 +2184,7 @@
           <a:p>
             <a:fld id="{2FB4BB17-FCBC-4595-8ACB-9B54EC581F3F}" type="datetimeFigureOut">
               <a:rPr lang="en-US" smtClean="0"/>
-              <a:t>5/7/2020</a:t>
+              <a:t>7/8/2020</a:t>
             </a:fld>
             <a:endParaRPr lang="en-US"/>
           </a:p>
@@ -2459,7 +2461,7 @@
           <a:p>
             <a:fld id="{2FB4BB17-FCBC-4595-8ACB-9B54EC581F3F}" type="datetimeFigureOut">
               <a:rPr lang="en-US" smtClean="0"/>
-              <a:t>5/7/2020</a:t>
+              <a:t>7/8/2020</a:t>
             </a:fld>
             <a:endParaRPr lang="en-US"/>
           </a:p>
@@ -2712,7 +2714,7 @@
           <a:p>
             <a:fld id="{2FB4BB17-FCBC-4595-8ACB-9B54EC581F3F}" type="datetimeFigureOut">
               <a:rPr lang="en-US" smtClean="0"/>
-              <a:t>5/7/2020</a:t>
+              <a:t>7/8/2020</a:t>
             </a:fld>
             <a:endParaRPr lang="en-US"/>
           </a:p>
@@ -2925,7 +2927,7 @@
           <a:p>
             <a:fld id="{2FB4BB17-FCBC-4595-8ACB-9B54EC581F3F}" type="datetimeFigureOut">
               <a:rPr lang="en-US" smtClean="0"/>
-              <a:t>5/7/2020</a:t>
+              <a:t>7/8/2020</a:t>
             </a:fld>
             <a:endParaRPr lang="en-US"/>
           </a:p>
@@ -3652,8 +3654,13 @@
           <a:p>
             <a:r>
               <a:rPr lang="en-US" dirty="0" smtClean="0"/>
-              <a:t>Find and download the file “20191005_Lum3_OBJ39421_QLSCOUT_SCOPE_20xCarrier_5e5_750ms_8x_05_400pg_Fig.3”</a:t>
-            </a:r>
+              <a:t>Find and download the file </a:t>
+            </a:r>
+            <a:r>
+              <a:rPr lang="en-US" dirty="0"/>
+              <a:t>“20191012_Lum1_OBJ39421_QLSCOUT_SCOPE_20xCarrier_1e5_300ms_8x_01_400pg_Fig4”</a:t>
+            </a:r>
+            <a:endParaRPr lang="en-US" dirty="0" smtClean="0"/>
           </a:p>
           <a:p>
             <a:r>
@@ -3682,21 +3689,22 @@
       </p:sp>
       <p:pic>
         <p:nvPicPr>
-          <p:cNvPr id="4" name="Picture 3"/>
+          <p:cNvPr id="5" name="Picture 4"/>
           <p:cNvPicPr>
             <a:picLocks noChangeAspect="1"/>
           </p:cNvPicPr>
           <p:nvPr/>
         </p:nvPicPr>
-        <p:blipFill rotWithShape="1">
+        <p:blipFill>
           <a:blip r:embed="rId3"/>
-          <a:srcRect l="16633" t="20140" r="34266" b="29349"/>
-          <a:stretch/>
+          <a:stretch>
+            <a:fillRect/>
+          </a:stretch>
         </p:blipFill>
         <p:spPr>
           <a:xfrm>
-            <a:off x="1261872" y="4782312"/>
-            <a:ext cx="5532120" cy="1547626"/>
+            <a:off x="1265837" y="4838610"/>
+            <a:ext cx="7114606" cy="1473290"/>
           </a:xfrm>
           <a:prstGeom prst="rect">
             <a:avLst/>
@@ -3735,7 +3743,7 @@
       </p:grpSpPr>
       <p:pic>
         <p:nvPicPr>
-          <p:cNvPr id="3" name="Picture 2"/>
+          <p:cNvPr id="4" name="Picture 3"/>
           <p:cNvPicPr>
             <a:picLocks noChangeAspect="1"/>
           </p:cNvPicPr>
@@ -3749,8 +3757,8 @@
         </p:blipFill>
         <p:spPr>
           <a:xfrm>
-            <a:off x="4744669" y="2357138"/>
-            <a:ext cx="7201967" cy="3217289"/>
+            <a:off x="4589140" y="2381622"/>
+            <a:ext cx="7525026" cy="3361607"/>
           </a:xfrm>
           <a:prstGeom prst="rect">
             <a:avLst/>
@@ -3785,29 +3793,6 @@
           </a:p>
         </p:txBody>
       </p:sp>
-      <p:pic>
-        <p:nvPicPr>
-          <p:cNvPr id="5" name="Picture 4"/>
-          <p:cNvPicPr>
-            <a:picLocks noChangeAspect="1"/>
-          </p:cNvPicPr>
-          <p:nvPr/>
-        </p:nvPicPr>
-        <p:blipFill rotWithShape="1">
-          <a:blip r:embed="rId3"/>
-          <a:srcRect l="16633" t="20140" r="34266" b="29349"/>
-          <a:stretch/>
-        </p:blipFill>
-        <p:spPr>
-          <a:xfrm>
-            <a:off x="137160" y="2624328"/>
-            <a:ext cx="4281867" cy="1197864"/>
-          </a:xfrm>
-          <a:prstGeom prst="rect">
-            <a:avLst/>
-          </a:prstGeom>
-        </p:spPr>
-      </p:pic>
       <p:sp>
         <p:nvSpPr>
           <p:cNvPr id="6" name="TextBox 5"/>
@@ -3882,11 +3867,7 @@
             </a:pPr>
             <a:r>
               <a:rPr lang="en-US" dirty="0" smtClean="0"/>
-              <a:t>Drag the file into the “Input Files” </a:t>
-            </a:r>
-            <a:r>
-              <a:rPr lang="en-US" dirty="0" smtClean="0"/>
-              <a:t>box</a:t>
+              <a:t>Drag the file into the “Input Files” box</a:t>
             </a:r>
           </a:p>
           <a:p>
@@ -3901,7 +3882,6 @@
               <a:rPr lang="en-US" dirty="0" smtClean="0"/>
               <a:t>Set the experimental design</a:t>
             </a:r>
-            <a:endParaRPr lang="en-US" dirty="0" smtClean="0"/>
           </a:p>
           <a:p>
             <a:pPr marL="228600" indent="-228600">
@@ -3913,11 +3893,7 @@
             </a:pPr>
             <a:r>
               <a:rPr lang="en-US" dirty="0" smtClean="0"/>
-              <a:t>Click </a:t>
-            </a:r>
-            <a:r>
-              <a:rPr lang="en-US" dirty="0" smtClean="0"/>
-              <a:t>“Analyze”</a:t>
+              <a:t>Click “Analyze”</a:t>
             </a:r>
             <a:endParaRPr lang="en-US" dirty="0"/>
           </a:p>
@@ -3964,8 +3940,8 @@
         </p:nvCxnSpPr>
         <p:spPr>
           <a:xfrm flipV="1">
-            <a:off x="3212327" y="3702948"/>
-            <a:ext cx="1725433" cy="563681"/>
+            <a:off x="3212327" y="3511605"/>
+            <a:ext cx="3266111" cy="755025"/>
           </a:xfrm>
           <a:prstGeom prst="straightConnector1">
             <a:avLst/>
@@ -4022,6 +3998,30 @@
           </a:fontRef>
         </p:style>
       </p:cxnSp>
+      <p:pic>
+        <p:nvPicPr>
+          <p:cNvPr id="9" name="Picture 8"/>
+          <p:cNvPicPr>
+            <a:picLocks noChangeAspect="1"/>
+          </p:cNvPicPr>
+          <p:nvPr/>
+        </p:nvPicPr>
+        <p:blipFill>
+          <a:blip r:embed="rId3"/>
+          <a:stretch>
+            <a:fillRect/>
+          </a:stretch>
+        </p:blipFill>
+        <p:spPr>
+          <a:xfrm>
+            <a:off x="219456" y="2626670"/>
+            <a:ext cx="4273405" cy="884935"/>
+          </a:xfrm>
+          <a:prstGeom prst="rect">
+            <a:avLst/>
+          </a:prstGeom>
+        </p:spPr>
+      </p:pic>
     </p:spTree>
     <p:extLst>
       <p:ext uri="{BB962C8B-B14F-4D97-AF65-F5344CB8AC3E}">
@@ -4089,7 +4089,7 @@
         <p:spPr>
           <a:xfrm>
             <a:off x="219456" y="4785157"/>
-            <a:ext cx="11707501" cy="1990288"/>
+            <a:ext cx="11707501" cy="1585049"/>
           </a:xfrm>
           <a:prstGeom prst="rect">
             <a:avLst/>
@@ -4124,7 +4124,19 @@
             </a:pPr>
             <a:r>
               <a:rPr lang="en-US" dirty="0" smtClean="0"/>
-              <a:t>Sum s/n and ion flux distributions will be displayed</a:t>
+              <a:t>Quant </a:t>
+            </a:r>
+            <a:r>
+              <a:rPr lang="en-US" dirty="0" smtClean="0"/>
+              <a:t>s/n and </a:t>
+            </a:r>
+            <a:r>
+              <a:rPr lang="en-US" dirty="0" smtClean="0"/>
+              <a:t>Quant ion </a:t>
+            </a:r>
+            <a:r>
+              <a:rPr lang="en-US" dirty="0" smtClean="0"/>
+              <a:t>flux distributions will be displayed</a:t>
             </a:r>
           </a:p>
           <a:p>
@@ -4137,11 +4149,23 @@
             </a:pPr>
             <a:r>
               <a:rPr lang="en-US" dirty="0" smtClean="0"/>
-              <a:t>The median Sum s/n and ion flux will be </a:t>
+              <a:t>The median </a:t>
             </a:r>
             <a:r>
               <a:rPr lang="en-US" dirty="0" smtClean="0"/>
-              <a:t>calculated</a:t>
+              <a:t>Quant </a:t>
+            </a:r>
+            <a:r>
+              <a:rPr lang="en-US" dirty="0" smtClean="0"/>
+              <a:t>s/n </a:t>
+            </a:r>
+            <a:r>
+              <a:rPr lang="en-US" dirty="0" smtClean="0"/>
+              <a:t>and Quant </a:t>
+            </a:r>
+            <a:r>
+              <a:rPr lang="en-US" dirty="0" smtClean="0"/>
+              <a:t>ion flux will be calculated</a:t>
             </a:r>
           </a:p>
           <a:p>
@@ -4154,28 +4178,18 @@
             </a:pPr>
             <a:r>
               <a:rPr lang="en-US" dirty="0" smtClean="0"/>
-              <a:t>The estimated carrier level will be calculated</a:t>
-            </a:r>
-            <a:endParaRPr lang="en-US" dirty="0" smtClean="0"/>
-          </a:p>
-          <a:p>
-            <a:pPr marL="173038" indent="-173038">
-              <a:spcAft>
-                <a:spcPts val="1000"/>
-              </a:spcAft>
-              <a:buFont typeface="Arial" panose="020B0604020202020204" pitchFamily="34" charset="0"/>
-              <a:buChar char="•"/>
-            </a:pPr>
+              <a:t>The </a:t>
+            </a:r>
             <a:r>
               <a:rPr lang="en-US" dirty="0" smtClean="0"/>
-              <a:t>The suggested s/n cutoff and the suggested max IT will be calculated</a:t>
+              <a:t>suggested s/n cutoff and the suggested max IT will be calculated</a:t>
             </a:r>
           </a:p>
         </p:txBody>
       </p:sp>
       <p:pic>
         <p:nvPicPr>
-          <p:cNvPr id="6" name="Picture 5"/>
+          <p:cNvPr id="3" name="Picture 2"/>
           <p:cNvPicPr>
             <a:picLocks noChangeAspect="1"/>
           </p:cNvPicPr>
@@ -4189,8 +4203,8 @@
         </p:blipFill>
         <p:spPr>
           <a:xfrm>
-            <a:off x="2046165" y="826936"/>
-            <a:ext cx="8718615" cy="3894812"/>
+            <a:off x="1850324" y="799488"/>
+            <a:ext cx="8924069" cy="3986593"/>
           </a:xfrm>
           <a:prstGeom prst="rect">
             <a:avLst/>
@@ -4237,6 +4251,269 @@
             <p:ph type="title"/>
           </p:nvPr>
         </p:nvSpPr>
+        <p:spPr>
+          <a:xfrm>
+            <a:off x="143123" y="-199418"/>
+            <a:ext cx="11134344" cy="1325563"/>
+          </a:xfrm>
+        </p:spPr>
+        <p:txBody>
+          <a:bodyPr/>
+          <a:lstStyle/>
+          <a:p>
+            <a:r>
+              <a:rPr lang="en-US" dirty="0" smtClean="0"/>
+              <a:t>Viewing the results</a:t>
+            </a:r>
+            <a:endParaRPr lang="en-US" dirty="0"/>
+          </a:p>
+        </p:txBody>
+      </p:sp>
+      <p:sp>
+        <p:nvSpPr>
+          <p:cNvPr id="5" name="TextBox 4"/>
+          <p:cNvSpPr txBox="1"/>
+          <p:nvPr/>
+        </p:nvSpPr>
+        <p:spPr>
+          <a:xfrm>
+            <a:off x="219456" y="4785157"/>
+            <a:ext cx="11707501" cy="774571"/>
+          </a:xfrm>
+          <a:prstGeom prst="rect">
+            <a:avLst/>
+          </a:prstGeom>
+          <a:noFill/>
+        </p:spPr>
+        <p:txBody>
+          <a:bodyPr wrap="square" rtlCol="0">
+            <a:spAutoFit/>
+          </a:bodyPr>
+          <a:lstStyle/>
+          <a:p>
+            <a:pPr marL="173038" indent="-173038">
+              <a:spcAft>
+                <a:spcPts val="1000"/>
+              </a:spcAft>
+              <a:buFont typeface="Arial" panose="020B0604020202020204" pitchFamily="34" charset="0"/>
+              <a:buChar char="•"/>
+            </a:pPr>
+            <a:r>
+              <a:rPr lang="en-US" dirty="0" smtClean="0"/>
+              <a:t>The </a:t>
+            </a:r>
+            <a:r>
+              <a:rPr lang="en-US" dirty="0" smtClean="0"/>
+              <a:t>estimated carrier level will be calculated</a:t>
+            </a:r>
+          </a:p>
+          <a:p>
+            <a:pPr marL="173038" indent="-173038">
+              <a:spcAft>
+                <a:spcPts val="1000"/>
+              </a:spcAft>
+              <a:buFont typeface="Arial" panose="020B0604020202020204" pitchFamily="34" charset="0"/>
+              <a:buChar char="•"/>
+            </a:pPr>
+            <a:r>
+              <a:rPr lang="en-US" dirty="0" smtClean="0"/>
+              <a:t>The S/N to Carrier Ratio and Carrier Ratio Histogram will be shown</a:t>
+            </a:r>
+            <a:endParaRPr lang="en-US" dirty="0" smtClean="0"/>
+          </a:p>
+        </p:txBody>
+      </p:sp>
+      <p:pic>
+        <p:nvPicPr>
+          <p:cNvPr id="6" name="Picture 5"/>
+          <p:cNvPicPr>
+            <a:picLocks noChangeAspect="1"/>
+          </p:cNvPicPr>
+          <p:nvPr/>
+        </p:nvPicPr>
+        <p:blipFill>
+          <a:blip r:embed="rId2"/>
+          <a:stretch>
+            <a:fillRect/>
+          </a:stretch>
+        </p:blipFill>
+        <p:spPr>
+          <a:xfrm>
+            <a:off x="2123675" y="893231"/>
+            <a:ext cx="8446426" cy="3773218"/>
+          </a:xfrm>
+          <a:prstGeom prst="rect">
+            <a:avLst/>
+          </a:prstGeom>
+        </p:spPr>
+      </p:pic>
+    </p:spTree>
+    <p:extLst>
+      <p:ext uri="{BB962C8B-B14F-4D97-AF65-F5344CB8AC3E}">
+        <p14:creationId xmlns:p14="http://schemas.microsoft.com/office/powerpoint/2010/main" val="777354548"/>
+      </p:ext>
+    </p:extLst>
+  </p:cSld>
+  <p:clrMapOvr>
+    <a:masterClrMapping/>
+  </p:clrMapOvr>
+</p:sld>
+</file>
+
+<file path=ppt/slides/slide7.xml><?xml version="1.0" encoding="utf-8"?>
+<p:sld xmlns:a="http://schemas.openxmlformats.org/drawingml/2006/main" xmlns:r="http://schemas.openxmlformats.org/officeDocument/2006/relationships" xmlns:p="http://schemas.openxmlformats.org/presentationml/2006/main">
+  <p:cSld>
+    <p:spTree>
+      <p:nvGrpSpPr>
+        <p:cNvPr id="1" name=""/>
+        <p:cNvGrpSpPr/>
+        <p:nvPr/>
+      </p:nvGrpSpPr>
+      <p:grpSpPr>
+        <a:xfrm>
+          <a:off x="0" y="0"/>
+          <a:ext cx="0" cy="0"/>
+          <a:chOff x="0" y="0"/>
+          <a:chExt cx="0" cy="0"/>
+        </a:xfrm>
+      </p:grpSpPr>
+      <p:sp>
+        <p:nvSpPr>
+          <p:cNvPr id="2" name="Title 1"/>
+          <p:cNvSpPr>
+            <a:spLocks noGrp="1"/>
+          </p:cNvSpPr>
+          <p:nvPr>
+            <p:ph type="title"/>
+          </p:nvPr>
+        </p:nvSpPr>
+        <p:spPr>
+          <a:xfrm>
+            <a:off x="143123" y="-199418"/>
+            <a:ext cx="11134344" cy="1325563"/>
+          </a:xfrm>
+        </p:spPr>
+        <p:txBody>
+          <a:bodyPr/>
+          <a:lstStyle/>
+          <a:p>
+            <a:r>
+              <a:rPr lang="en-US" dirty="0" smtClean="0"/>
+              <a:t>Viewing the results</a:t>
+            </a:r>
+            <a:endParaRPr lang="en-US" dirty="0"/>
+          </a:p>
+        </p:txBody>
+      </p:sp>
+      <p:sp>
+        <p:nvSpPr>
+          <p:cNvPr id="5" name="TextBox 4"/>
+          <p:cNvSpPr txBox="1"/>
+          <p:nvPr/>
+        </p:nvSpPr>
+        <p:spPr>
+          <a:xfrm>
+            <a:off x="219456" y="4785157"/>
+            <a:ext cx="11707501" cy="369332"/>
+          </a:xfrm>
+          <a:prstGeom prst="rect">
+            <a:avLst/>
+          </a:prstGeom>
+          <a:noFill/>
+        </p:spPr>
+        <p:txBody>
+          <a:bodyPr wrap="square" rtlCol="0">
+            <a:spAutoFit/>
+          </a:bodyPr>
+          <a:lstStyle/>
+          <a:p>
+            <a:pPr marL="173038" indent="-173038">
+              <a:spcAft>
+                <a:spcPts val="1000"/>
+              </a:spcAft>
+              <a:buFont typeface="Arial" panose="020B0604020202020204" pitchFamily="34" charset="0"/>
+              <a:buChar char="•"/>
+            </a:pPr>
+            <a:r>
+              <a:rPr lang="en-US" dirty="0" smtClean="0"/>
+              <a:t>Sum </a:t>
+            </a:r>
+            <a:r>
+              <a:rPr lang="en-US" dirty="0" smtClean="0"/>
+              <a:t>s/n and ion flux distributions will be </a:t>
+            </a:r>
+            <a:r>
+              <a:rPr lang="en-US" dirty="0" smtClean="0"/>
+              <a:t>displayed</a:t>
+            </a:r>
+            <a:endParaRPr lang="en-US" dirty="0" smtClean="0"/>
+          </a:p>
+        </p:txBody>
+      </p:sp>
+      <p:pic>
+        <p:nvPicPr>
+          <p:cNvPr id="3" name="Picture 2"/>
+          <p:cNvPicPr>
+            <a:picLocks noChangeAspect="1"/>
+          </p:cNvPicPr>
+          <p:nvPr/>
+        </p:nvPicPr>
+        <p:blipFill>
+          <a:blip r:embed="rId2"/>
+          <a:stretch>
+            <a:fillRect/>
+          </a:stretch>
+        </p:blipFill>
+        <p:spPr>
+          <a:xfrm>
+            <a:off x="1980808" y="862641"/>
+            <a:ext cx="8497929" cy="3796226"/>
+          </a:xfrm>
+          <a:prstGeom prst="rect">
+            <a:avLst/>
+          </a:prstGeom>
+        </p:spPr>
+      </p:pic>
+    </p:spTree>
+    <p:extLst>
+      <p:ext uri="{BB962C8B-B14F-4D97-AF65-F5344CB8AC3E}">
+        <p14:creationId xmlns:p14="http://schemas.microsoft.com/office/powerpoint/2010/main" val="1421633317"/>
+      </p:ext>
+    </p:extLst>
+  </p:cSld>
+  <p:clrMapOvr>
+    <a:masterClrMapping/>
+  </p:clrMapOvr>
+</p:sld>
+</file>
+
+<file path=ppt/slides/slide8.xml><?xml version="1.0" encoding="utf-8"?>
+<p:sld xmlns:a="http://schemas.openxmlformats.org/drawingml/2006/main" xmlns:r="http://schemas.openxmlformats.org/officeDocument/2006/relationships" xmlns:p="http://schemas.openxmlformats.org/presentationml/2006/main">
+  <p:cSld>
+    <p:spTree>
+      <p:nvGrpSpPr>
+        <p:cNvPr id="1" name=""/>
+        <p:cNvGrpSpPr/>
+        <p:nvPr/>
+      </p:nvGrpSpPr>
+      <p:grpSpPr>
+        <a:xfrm>
+          <a:off x="0" y="0"/>
+          <a:ext cx="0" cy="0"/>
+          <a:chOff x="0" y="0"/>
+          <a:chExt cx="0" cy="0"/>
+        </a:xfrm>
+      </p:grpSpPr>
+      <p:sp>
+        <p:nvSpPr>
+          <p:cNvPr id="2" name="Title 1"/>
+          <p:cNvSpPr>
+            <a:spLocks noGrp="1"/>
+          </p:cNvSpPr>
+          <p:nvPr>
+            <p:ph type="title"/>
+          </p:nvPr>
+        </p:nvSpPr>
         <p:spPr/>
         <p:txBody>
           <a:bodyPr/>
@@ -4250,25 +4527,83 @@
           </a:p>
         </p:txBody>
       </p:sp>
+      <p:sp>
+        <p:nvSpPr>
+          <p:cNvPr id="9" name="TextBox 8"/>
+          <p:cNvSpPr txBox="1"/>
+          <p:nvPr/>
+        </p:nvSpPr>
+        <p:spPr>
+          <a:xfrm>
+            <a:off x="88392" y="3432281"/>
+            <a:ext cx="253980" cy="276999"/>
+          </a:xfrm>
+          <a:prstGeom prst="rect">
+            <a:avLst/>
+          </a:prstGeom>
+          <a:noFill/>
+        </p:spPr>
+        <p:txBody>
+          <a:bodyPr wrap="square" rtlCol="0">
+            <a:spAutoFit/>
+          </a:bodyPr>
+          <a:lstStyle/>
+          <a:p>
+            <a:r>
+              <a:rPr lang="en-US" sz="1200" dirty="0" smtClean="0"/>
+              <a:t>1</a:t>
+            </a:r>
+            <a:endParaRPr lang="en-US" sz="1200" dirty="0"/>
+          </a:p>
+        </p:txBody>
+      </p:sp>
+      <p:sp>
+        <p:nvSpPr>
+          <p:cNvPr id="10" name="TextBox 9"/>
+          <p:cNvSpPr txBox="1"/>
+          <p:nvPr/>
+        </p:nvSpPr>
+        <p:spPr>
+          <a:xfrm>
+            <a:off x="88392" y="5529070"/>
+            <a:ext cx="253980" cy="276999"/>
+          </a:xfrm>
+          <a:prstGeom prst="rect">
+            <a:avLst/>
+          </a:prstGeom>
+          <a:noFill/>
+        </p:spPr>
+        <p:txBody>
+          <a:bodyPr wrap="square" rtlCol="0">
+            <a:spAutoFit/>
+          </a:bodyPr>
+          <a:lstStyle/>
+          <a:p>
+            <a:r>
+              <a:rPr lang="en-US" sz="1200" dirty="0" smtClean="0"/>
+              <a:t>2</a:t>
+            </a:r>
+            <a:endParaRPr lang="en-US" sz="1200" dirty="0"/>
+          </a:p>
+        </p:txBody>
+      </p:sp>
       <p:pic>
         <p:nvPicPr>
-          <p:cNvPr id="4" name="Content Placeholder 3"/>
+          <p:cNvPr id="11" name="Picture 10"/>
           <p:cNvPicPr>
-            <a:picLocks noGrp="1" noChangeAspect="1"/>
+            <a:picLocks noChangeAspect="1"/>
           </p:cNvPicPr>
-          <p:nvPr>
-            <p:ph idx="1"/>
-          </p:nvPr>
+          <p:nvPr/>
         </p:nvPicPr>
         <p:blipFill rotWithShape="1">
           <a:blip r:embed="rId2"/>
-          <a:srcRect l="18189" t="7847" r="25267" b="73660"/>
+          <a:srcRect l="49093" t="1" b="2645"/>
           <a:stretch/>
         </p:blipFill>
         <p:spPr>
           <a:xfrm>
-            <a:off x="345420" y="1755647"/>
-            <a:ext cx="5559965" cy="1426465"/>
+            <a:off x="454478" y="4428931"/>
+            <a:ext cx="9432232" cy="805166"/>
           </a:xfrm>
           <a:prstGeom prst="rect">
             <a:avLst/>
@@ -4277,7 +4612,30 @@
       </p:pic>
       <p:pic>
         <p:nvPicPr>
-          <p:cNvPr id="5" name="Picture 4"/>
+          <p:cNvPr id="12" name="Picture 11"/>
+          <p:cNvPicPr>
+            <a:picLocks noChangeAspect="1"/>
+          </p:cNvPicPr>
+          <p:nvPr/>
+        </p:nvPicPr>
+        <p:blipFill rotWithShape="1">
+          <a:blip r:embed="rId2"/>
+          <a:srcRect t="1" r="50558" b="-3194"/>
+          <a:stretch/>
+        </p:blipFill>
+        <p:spPr>
+          <a:xfrm>
+            <a:off x="454478" y="3490488"/>
+            <a:ext cx="9160784" cy="853447"/>
+          </a:xfrm>
+          <a:prstGeom prst="rect">
+            <a:avLst/>
+          </a:prstGeom>
+        </p:spPr>
+      </p:pic>
+      <p:pic>
+        <p:nvPicPr>
+          <p:cNvPr id="13" name="Picture 12"/>
           <p:cNvPicPr>
             <a:picLocks noChangeAspect="1"/>
           </p:cNvPicPr>
@@ -4291,8 +4649,8 @@
         </p:blipFill>
         <p:spPr>
           <a:xfrm>
-            <a:off x="345420" y="5131497"/>
-            <a:ext cx="11237458" cy="473755"/>
+            <a:off x="454478" y="5530883"/>
+            <a:ext cx="10687050" cy="638175"/>
           </a:xfrm>
           <a:prstGeom prst="rect">
             <a:avLst/>
@@ -4301,22 +4659,21 @@
       </p:pic>
       <p:pic>
         <p:nvPicPr>
-          <p:cNvPr id="6" name="Picture 5"/>
+          <p:cNvPr id="15" name="Picture 14"/>
           <p:cNvPicPr>
             <a:picLocks noChangeAspect="1"/>
           </p:cNvPicPr>
           <p:nvPr/>
         </p:nvPicPr>
-        <p:blipFill>
+        <p:blipFill rotWithShape="1">
           <a:blip r:embed="rId4"/>
-          <a:stretch>
-            <a:fillRect/>
-          </a:stretch>
+          <a:srcRect l="6921" b="7237"/>
+          <a:stretch/>
         </p:blipFill>
         <p:spPr>
           <a:xfrm>
-            <a:off x="345420" y="3640073"/>
-            <a:ext cx="11237458" cy="764198"/>
+            <a:off x="836762" y="1865582"/>
+            <a:ext cx="6649360" cy="1360697"/>
           </a:xfrm>
           <a:prstGeom prst="rect">
             <a:avLst/>
@@ -4331,7 +4688,7 @@
         </p:nvSpPr>
         <p:spPr>
           <a:xfrm>
-            <a:off x="91440" y="2401071"/>
+            <a:off x="703977" y="2422819"/>
             <a:ext cx="253980" cy="246221"/>
           </a:xfrm>
           <a:prstGeom prst="rect">
@@ -4346,10 +4703,10 @@
           <a:lstStyle/>
           <a:p>
             <a:r>
-              <a:rPr lang="en-US" sz="1000" dirty="0" smtClean="0"/>
+              <a:rPr lang="en-US" sz="1000" b="1" dirty="0" smtClean="0"/>
               <a:t>1</a:t>
             </a:r>
-            <a:endParaRPr lang="en-US" sz="1000" dirty="0"/>
+            <a:endParaRPr lang="en-US" sz="1000" b="1" dirty="0"/>
           </a:p>
         </p:txBody>
       </p:sp>
@@ -4361,7 +4718,7 @@
         </p:nvSpPr>
         <p:spPr>
           <a:xfrm>
-            <a:off x="88392" y="2635767"/>
+            <a:off x="709772" y="2614938"/>
             <a:ext cx="253980" cy="246221"/>
           </a:xfrm>
           <a:prstGeom prst="rect">
@@ -4376,70 +4733,10 @@
           <a:lstStyle/>
           <a:p>
             <a:r>
-              <a:rPr lang="en-US" sz="1000" dirty="0" smtClean="0"/>
+              <a:rPr lang="en-US" sz="1000" b="1" dirty="0" smtClean="0"/>
               <a:t>2</a:t>
             </a:r>
-            <a:endParaRPr lang="en-US" sz="1000" dirty="0"/>
-          </a:p>
-        </p:txBody>
-      </p:sp>
-      <p:sp>
-        <p:nvSpPr>
-          <p:cNvPr id="9" name="TextBox 8"/>
-          <p:cNvSpPr txBox="1"/>
-          <p:nvPr/>
-        </p:nvSpPr>
-        <p:spPr>
-          <a:xfrm>
-            <a:off x="88392" y="3432281"/>
-            <a:ext cx="253980" cy="276999"/>
-          </a:xfrm>
-          <a:prstGeom prst="rect">
-            <a:avLst/>
-          </a:prstGeom>
-          <a:noFill/>
-        </p:spPr>
-        <p:txBody>
-          <a:bodyPr wrap="square" rtlCol="0">
-            <a:spAutoFit/>
-          </a:bodyPr>
-          <a:lstStyle/>
-          <a:p>
-            <a:r>
-              <a:rPr lang="en-US" sz="1200" dirty="0" smtClean="0"/>
-              <a:t>1</a:t>
-            </a:r>
-            <a:endParaRPr lang="en-US" sz="1200" dirty="0"/>
-          </a:p>
-        </p:txBody>
-      </p:sp>
-      <p:sp>
-        <p:nvSpPr>
-          <p:cNvPr id="10" name="TextBox 9"/>
-          <p:cNvSpPr txBox="1"/>
-          <p:nvPr/>
-        </p:nvSpPr>
-        <p:spPr>
-          <a:xfrm>
-            <a:off x="88392" y="4936718"/>
-            <a:ext cx="253980" cy="276999"/>
-          </a:xfrm>
-          <a:prstGeom prst="rect">
-            <a:avLst/>
-          </a:prstGeom>
-          <a:noFill/>
-        </p:spPr>
-        <p:txBody>
-          <a:bodyPr wrap="square" rtlCol="0">
-            <a:spAutoFit/>
-          </a:bodyPr>
-          <a:lstStyle/>
-          <a:p>
-            <a:r>
-              <a:rPr lang="en-US" sz="1200" dirty="0" smtClean="0"/>
-              <a:t>2</a:t>
-            </a:r>
-            <a:endParaRPr lang="en-US" sz="1200" dirty="0"/>
+            <a:endParaRPr lang="en-US" sz="1000" b="1" dirty="0"/>
           </a:p>
         </p:txBody>
       </p:sp>
@@ -4462,7 +4759,7 @@
   <p:tag name="VARPPTCOMPATIBLERD03" val="RXP"/>
   <p:tag name="VARPPTTYPE" val="RXP"/>
   <p:tag name="VARPPTSLIDEFORMAT" val="RXP"/>
-  <p:tag name="VARSAVEMESSAGETIMESTAMP" val="RXP5/7/2020"/>
+  <p:tag name="VARSAVEMESSAGETIMESTAMP" val="RXP7/8/2020"/>
 </p:tagLst>
 </file>
 

</xml_diff>